<commit_message>
agregar logo, mejorar diagrama
</commit_message>
<xml_diff>
--- a/Presentacion Nodos.pptx
+++ b/Presentacion Nodos.pptx
@@ -104,6 +104,11 @@
       </a:defRPr>
     </a:lvl9pPr>
   </p:defaultTextStyle>
+  <p:extLst>
+    <p:ext uri="{EFAFB233-063F-42B5-8137-9DF3F51BA10A}">
+      <p15:sldGuideLst xmlns:p15="http://schemas.microsoft.com/office/powerpoint/2012/main"/>
+    </p:ext>
+  </p:extLst>
 </p:presentation>
 </file>
 
@@ -256,7 +261,7 @@
           <a:p>
             <a:fld id="{BCE2C7D5-6B23-44F0-B173-4306161E4B19}" type="datetimeFigureOut">
               <a:rPr lang="es-US" smtClean="0"/>
-              <a:t>10/17/2019</a:t>
+              <a:t>10/27/2019</a:t>
             </a:fld>
             <a:endParaRPr lang="es-US"/>
           </a:p>
@@ -456,7 +461,7 @@
           <a:p>
             <a:fld id="{BCE2C7D5-6B23-44F0-B173-4306161E4B19}" type="datetimeFigureOut">
               <a:rPr lang="es-US" smtClean="0"/>
-              <a:t>10/17/2019</a:t>
+              <a:t>10/27/2019</a:t>
             </a:fld>
             <a:endParaRPr lang="es-US"/>
           </a:p>
@@ -666,7 +671,7 @@
           <a:p>
             <a:fld id="{BCE2C7D5-6B23-44F0-B173-4306161E4B19}" type="datetimeFigureOut">
               <a:rPr lang="es-US" smtClean="0"/>
-              <a:t>10/17/2019</a:t>
+              <a:t>10/27/2019</a:t>
             </a:fld>
             <a:endParaRPr lang="es-US"/>
           </a:p>
@@ -866,7 +871,7 @@
           <a:p>
             <a:fld id="{BCE2C7D5-6B23-44F0-B173-4306161E4B19}" type="datetimeFigureOut">
               <a:rPr lang="es-US" smtClean="0"/>
-              <a:t>10/17/2019</a:t>
+              <a:t>10/27/2019</a:t>
             </a:fld>
             <a:endParaRPr lang="es-US"/>
           </a:p>
@@ -1142,7 +1147,7 @@
           <a:p>
             <a:fld id="{BCE2C7D5-6B23-44F0-B173-4306161E4B19}" type="datetimeFigureOut">
               <a:rPr lang="es-US" smtClean="0"/>
-              <a:t>10/17/2019</a:t>
+              <a:t>10/27/2019</a:t>
             </a:fld>
             <a:endParaRPr lang="es-US"/>
           </a:p>
@@ -1410,7 +1415,7 @@
           <a:p>
             <a:fld id="{BCE2C7D5-6B23-44F0-B173-4306161E4B19}" type="datetimeFigureOut">
               <a:rPr lang="es-US" smtClean="0"/>
-              <a:t>10/17/2019</a:t>
+              <a:t>10/27/2019</a:t>
             </a:fld>
             <a:endParaRPr lang="es-US"/>
           </a:p>
@@ -1825,7 +1830,7 @@
           <a:p>
             <a:fld id="{BCE2C7D5-6B23-44F0-B173-4306161E4B19}" type="datetimeFigureOut">
               <a:rPr lang="es-US" smtClean="0"/>
-              <a:t>10/17/2019</a:t>
+              <a:t>10/27/2019</a:t>
             </a:fld>
             <a:endParaRPr lang="es-US"/>
           </a:p>
@@ -1967,7 +1972,7 @@
           <a:p>
             <a:fld id="{BCE2C7D5-6B23-44F0-B173-4306161E4B19}" type="datetimeFigureOut">
               <a:rPr lang="es-US" smtClean="0"/>
-              <a:t>10/17/2019</a:t>
+              <a:t>10/27/2019</a:t>
             </a:fld>
             <a:endParaRPr lang="es-US"/>
           </a:p>
@@ -2080,7 +2085,7 @@
           <a:p>
             <a:fld id="{BCE2C7D5-6B23-44F0-B173-4306161E4B19}" type="datetimeFigureOut">
               <a:rPr lang="es-US" smtClean="0"/>
-              <a:t>10/17/2019</a:t>
+              <a:t>10/27/2019</a:t>
             </a:fld>
             <a:endParaRPr lang="es-US"/>
           </a:p>
@@ -2393,7 +2398,7 @@
           <a:p>
             <a:fld id="{BCE2C7D5-6B23-44F0-B173-4306161E4B19}" type="datetimeFigureOut">
               <a:rPr lang="es-US" smtClean="0"/>
-              <a:t>10/17/2019</a:t>
+              <a:t>10/27/2019</a:t>
             </a:fld>
             <a:endParaRPr lang="es-US"/>
           </a:p>
@@ -2682,7 +2687,7 @@
           <a:p>
             <a:fld id="{BCE2C7D5-6B23-44F0-B173-4306161E4B19}" type="datetimeFigureOut">
               <a:rPr lang="es-US" smtClean="0"/>
-              <a:t>10/17/2019</a:t>
+              <a:t>10/27/2019</a:t>
             </a:fld>
             <a:endParaRPr lang="es-US"/>
           </a:p>
@@ -2925,7 +2930,7 @@
           <a:p>
             <a:fld id="{BCE2C7D5-6B23-44F0-B173-4306161E4B19}" type="datetimeFigureOut">
               <a:rPr lang="es-US" smtClean="0"/>
-              <a:t>10/17/2019</a:t>
+              <a:t>10/27/2019</a:t>
             </a:fld>
             <a:endParaRPr lang="es-US"/>
           </a:p>
@@ -3620,7 +3625,253 @@
         </p:nvSpPr>
         <p:spPr>
           <a:xfrm>
-            <a:off x="5347659" y="4099612"/>
+            <a:off x="5245059" y="3441586"/>
+            <a:ext cx="2259089" cy="998806"/>
+          </a:xfrm>
+          <a:prstGeom prst="ellipse">
+            <a:avLst/>
+          </a:prstGeom>
+          <a:solidFill>
+            <a:schemeClr val="accent5"/>
+          </a:solidFill>
+          <a:ln>
+            <a:noFill/>
+          </a:ln>
+          <a:effectLst>
+            <a:outerShdw blurRad="76200" dir="13500000" sy="23000" kx="1200000" algn="br" rotWithShape="0">
+              <a:prstClr val="black">
+                <a:alpha val="20000"/>
+              </a:prstClr>
+            </a:outerShdw>
+          </a:effectLst>
+        </p:spPr>
+        <p:style>
+          <a:lnRef idx="2">
+            <a:schemeClr val="accent1">
+              <a:shade val="50000"/>
+            </a:schemeClr>
+          </a:lnRef>
+          <a:fillRef idx="1">
+            <a:schemeClr val="accent1"/>
+          </a:fillRef>
+          <a:effectRef idx="0">
+            <a:schemeClr val="accent1"/>
+          </a:effectRef>
+          <a:fontRef idx="minor">
+            <a:schemeClr val="lt1"/>
+          </a:fontRef>
+        </p:style>
+        <p:txBody>
+          <a:bodyPr rtlCol="0" anchor="ctr"/>
+          <a:lstStyle/>
+          <a:p>
+            <a:pPr algn="ctr"/>
+            <a:r>
+              <a:rPr lang="es-US" dirty="0">
+                <a:solidFill>
+                  <a:sysClr val="windowText" lastClr="000000"/>
+                </a:solidFill>
+              </a:rPr>
+              <a:t>Establecer independencia</a:t>
+            </a:r>
+          </a:p>
+        </p:txBody>
+      </p:sp>
+      <p:cxnSp>
+        <p:nvCxnSpPr>
+          <p:cNvPr id="12" name="Conector: angular 11">
+            <a:extLst>
+              <a:ext uri="{FF2B5EF4-FFF2-40B4-BE49-F238E27FC236}">
+                <a16:creationId xmlns:a16="http://schemas.microsoft.com/office/drawing/2014/main" id="{54765731-C756-496A-BA62-1B5D8F58DFA4}"/>
+              </a:ext>
+            </a:extLst>
+          </p:cNvPr>
+          <p:cNvCxnSpPr>
+            <a:cxnSpLocks/>
+            <a:endCxn id="8" idx="1"/>
+          </p:cNvCxnSpPr>
+          <p:nvPr/>
+        </p:nvCxnSpPr>
+        <p:spPr>
+          <a:xfrm rot="16200000" flipH="1">
+            <a:off x="4864372" y="2876335"/>
+            <a:ext cx="829468" cy="593578"/>
+          </a:xfrm>
+          <a:prstGeom prst="bentConnector3">
+            <a:avLst/>
+          </a:prstGeom>
+          <a:ln>
+            <a:solidFill>
+              <a:schemeClr val="tx1"/>
+            </a:solidFill>
+            <a:tailEnd type="triangle"/>
+          </a:ln>
+        </p:spPr>
+        <p:style>
+          <a:lnRef idx="1">
+            <a:schemeClr val="accent1"/>
+          </a:lnRef>
+          <a:fillRef idx="0">
+            <a:schemeClr val="accent1"/>
+          </a:fillRef>
+          <a:effectRef idx="0">
+            <a:schemeClr val="accent1"/>
+          </a:effectRef>
+          <a:fontRef idx="minor">
+            <a:schemeClr val="tx1"/>
+          </a:fontRef>
+        </p:style>
+      </p:cxnSp>
+      <p:cxnSp>
+        <p:nvCxnSpPr>
+          <p:cNvPr id="19" name="Conector: angular 18">
+            <a:extLst>
+              <a:ext uri="{FF2B5EF4-FFF2-40B4-BE49-F238E27FC236}">
+                <a16:creationId xmlns:a16="http://schemas.microsoft.com/office/drawing/2014/main" id="{15E50A0A-5685-40CF-9E1E-0B4B54B2ACF2}"/>
+              </a:ext>
+            </a:extLst>
+          </p:cNvPr>
+          <p:cNvCxnSpPr>
+            <a:cxnSpLocks/>
+            <a:stCxn id="7" idx="4"/>
+            <a:endCxn id="8" idx="6"/>
+          </p:cNvCxnSpPr>
+          <p:nvPr/>
+        </p:nvCxnSpPr>
+        <p:spPr>
+          <a:xfrm rot="5400000">
+            <a:off x="8374443" y="1888094"/>
+            <a:ext cx="1182600" cy="2923190"/>
+          </a:xfrm>
+          <a:prstGeom prst="bentConnector2">
+            <a:avLst/>
+          </a:prstGeom>
+          <a:ln>
+            <a:solidFill>
+              <a:schemeClr val="tx1"/>
+            </a:solidFill>
+            <a:tailEnd type="triangle"/>
+          </a:ln>
+        </p:spPr>
+        <p:style>
+          <a:lnRef idx="1">
+            <a:schemeClr val="accent1"/>
+          </a:lnRef>
+          <a:fillRef idx="0">
+            <a:schemeClr val="accent1"/>
+          </a:fillRef>
+          <a:effectRef idx="0">
+            <a:schemeClr val="accent1"/>
+          </a:effectRef>
+          <a:fontRef idx="minor">
+            <a:schemeClr val="tx1"/>
+          </a:fontRef>
+        </p:style>
+      </p:cxnSp>
+      <p:cxnSp>
+        <p:nvCxnSpPr>
+          <p:cNvPr id="11" name="Conector: angular 10">
+            <a:extLst>
+              <a:ext uri="{FF2B5EF4-FFF2-40B4-BE49-F238E27FC236}">
+                <a16:creationId xmlns:a16="http://schemas.microsoft.com/office/drawing/2014/main" id="{67AB28ED-738E-4283-8C3D-77D34A4D5CDD}"/>
+              </a:ext>
+            </a:extLst>
+          </p:cNvPr>
+          <p:cNvCxnSpPr>
+            <a:cxnSpLocks/>
+            <a:stCxn id="4" idx="4"/>
+            <a:endCxn id="8" idx="2"/>
+          </p:cNvCxnSpPr>
+          <p:nvPr/>
+        </p:nvCxnSpPr>
+        <p:spPr>
+          <a:xfrm rot="16200000" flipH="1">
+            <a:off x="3161130" y="1857060"/>
+            <a:ext cx="1182600" cy="2985257"/>
+          </a:xfrm>
+          <a:prstGeom prst="bentConnector2">
+            <a:avLst/>
+          </a:prstGeom>
+          <a:ln>
+            <a:tailEnd type="triangle"/>
+          </a:ln>
+        </p:spPr>
+        <p:style>
+          <a:lnRef idx="2">
+            <a:schemeClr val="dk1"/>
+          </a:lnRef>
+          <a:fillRef idx="0">
+            <a:schemeClr val="dk1"/>
+          </a:fillRef>
+          <a:effectRef idx="1">
+            <a:schemeClr val="dk1"/>
+          </a:effectRef>
+          <a:fontRef idx="minor">
+            <a:schemeClr val="tx1"/>
+          </a:fontRef>
+        </p:style>
+      </p:cxnSp>
+      <p:cxnSp>
+        <p:nvCxnSpPr>
+          <p:cNvPr id="14" name="Conector: angular 13">
+            <a:extLst>
+              <a:ext uri="{FF2B5EF4-FFF2-40B4-BE49-F238E27FC236}">
+                <a16:creationId xmlns:a16="http://schemas.microsoft.com/office/drawing/2014/main" id="{3560A7FF-DD50-44EC-A24B-E6DA3E3B630B}"/>
+              </a:ext>
+            </a:extLst>
+          </p:cNvPr>
+          <p:cNvCxnSpPr>
+            <a:cxnSpLocks/>
+            <a:stCxn id="6" idx="4"/>
+            <a:endCxn id="8" idx="7"/>
+          </p:cNvCxnSpPr>
+          <p:nvPr/>
+        </p:nvCxnSpPr>
+        <p:spPr>
+          <a:xfrm rot="5400000">
+            <a:off x="7024335" y="2907366"/>
+            <a:ext cx="829469" cy="531514"/>
+          </a:xfrm>
+          <a:prstGeom prst="bentConnector3">
+            <a:avLst/>
+          </a:prstGeom>
+          <a:ln>
+            <a:solidFill>
+              <a:schemeClr val="tx1"/>
+            </a:solidFill>
+            <a:tailEnd type="triangle"/>
+          </a:ln>
+        </p:spPr>
+        <p:style>
+          <a:lnRef idx="1">
+            <a:schemeClr val="accent1"/>
+          </a:lnRef>
+          <a:fillRef idx="0">
+            <a:schemeClr val="accent1"/>
+          </a:fillRef>
+          <a:effectRef idx="0">
+            <a:schemeClr val="accent1"/>
+          </a:effectRef>
+          <a:fontRef idx="minor">
+            <a:schemeClr val="tx1"/>
+          </a:fontRef>
+        </p:style>
+      </p:cxnSp>
+      <p:sp>
+        <p:nvSpPr>
+          <p:cNvPr id="16" name="Elipse 15">
+            <a:extLst>
+              <a:ext uri="{FF2B5EF4-FFF2-40B4-BE49-F238E27FC236}">
+                <a16:creationId xmlns:a16="http://schemas.microsoft.com/office/drawing/2014/main" id="{CA2C17EA-29E2-4681-980C-63B9F5FD42C2}"/>
+              </a:ext>
+            </a:extLst>
+          </p:cNvPr>
+          <p:cNvSpPr/>
+          <p:nvPr/>
+        </p:nvSpPr>
+        <p:spPr>
+          <a:xfrm>
+            <a:off x="5315378" y="261374"/>
             <a:ext cx="2053883" cy="998806"/>
           </a:xfrm>
           <a:prstGeom prst="ellipse">
@@ -3667,29 +3918,77 @@
                   <a:sysClr val="windowText" lastClr="000000"/>
                 </a:solidFill>
               </a:rPr>
-              <a:t>Demanda de energía</a:t>
+              <a:t>Análisis de datos</a:t>
             </a:r>
           </a:p>
         </p:txBody>
       </p:sp>
       <p:cxnSp>
         <p:nvCxnSpPr>
-          <p:cNvPr id="10" name="Conector: angular 9">
-            <a:extLst>
-              <a:ext uri="{FF2B5EF4-FFF2-40B4-BE49-F238E27FC236}">
-                <a16:creationId xmlns:a16="http://schemas.microsoft.com/office/drawing/2014/main" id="{0FDF61DA-B803-466B-9619-FCEF20FFE185}"/>
+          <p:cNvPr id="17" name="Conector: angular 16">
+            <a:extLst>
+              <a:ext uri="{FF2B5EF4-FFF2-40B4-BE49-F238E27FC236}">
+                <a16:creationId xmlns:a16="http://schemas.microsoft.com/office/drawing/2014/main" id="{774A75E3-7E42-4829-9F0B-DA6B9FFC9ECA}"/>
               </a:ext>
             </a:extLst>
           </p:cNvPr>
           <p:cNvCxnSpPr>
             <a:cxnSpLocks/>
+            <a:stCxn id="16" idx="6"/>
+            <a:endCxn id="7" idx="0"/>
           </p:cNvCxnSpPr>
           <p:nvPr/>
         </p:nvCxnSpPr>
         <p:spPr>
-          <a:xfrm rot="16200000" flipH="1">
-            <a:off x="2883418" y="2134774"/>
-            <a:ext cx="1840626" cy="3087857"/>
+          <a:xfrm>
+            <a:off x="7369261" y="760777"/>
+            <a:ext cx="3058077" cy="998806"/>
+          </a:xfrm>
+          <a:prstGeom prst="bentConnector2">
+            <a:avLst/>
+          </a:prstGeom>
+          <a:ln>
+            <a:solidFill>
+              <a:schemeClr val="tx1"/>
+            </a:solidFill>
+            <a:tailEnd type="triangle"/>
+          </a:ln>
+        </p:spPr>
+        <p:style>
+          <a:lnRef idx="1">
+            <a:schemeClr val="accent1"/>
+          </a:lnRef>
+          <a:fillRef idx="0">
+            <a:schemeClr val="accent1"/>
+          </a:fillRef>
+          <a:effectRef idx="0">
+            <a:schemeClr val="accent1"/>
+          </a:effectRef>
+          <a:fontRef idx="minor">
+            <a:schemeClr val="tx1"/>
+          </a:fontRef>
+        </p:style>
+      </p:cxnSp>
+      <p:cxnSp>
+        <p:nvCxnSpPr>
+          <p:cNvPr id="18" name="Conector: angular 17">
+            <a:extLst>
+              <a:ext uri="{FF2B5EF4-FFF2-40B4-BE49-F238E27FC236}">
+                <a16:creationId xmlns:a16="http://schemas.microsoft.com/office/drawing/2014/main" id="{CD298EA9-CF54-4794-92FC-A4773743B5C2}"/>
+              </a:ext>
+            </a:extLst>
+          </p:cNvPr>
+          <p:cNvCxnSpPr>
+            <a:cxnSpLocks/>
+            <a:stCxn id="16" idx="2"/>
+            <a:endCxn id="4" idx="0"/>
+          </p:cNvCxnSpPr>
+          <p:nvPr/>
+        </p:nvCxnSpPr>
+        <p:spPr>
+          <a:xfrm rot="10800000" flipV="1">
+            <a:off x="2259802" y="760777"/>
+            <a:ext cx="3055576" cy="998806"/>
           </a:xfrm>
           <a:prstGeom prst="bentConnector2">
             <a:avLst/>
@@ -3715,24 +4014,184 @@
       </p:cxnSp>
       <p:cxnSp>
         <p:nvCxnSpPr>
-          <p:cNvPr id="12" name="Conector: angular 11">
-            <a:extLst>
-              <a:ext uri="{FF2B5EF4-FFF2-40B4-BE49-F238E27FC236}">
-                <a16:creationId xmlns:a16="http://schemas.microsoft.com/office/drawing/2014/main" id="{54765731-C756-496A-BA62-1B5D8F58DFA4}"/>
+          <p:cNvPr id="20" name="Conector: angular 19">
+            <a:extLst>
+              <a:ext uri="{FF2B5EF4-FFF2-40B4-BE49-F238E27FC236}">
+                <a16:creationId xmlns:a16="http://schemas.microsoft.com/office/drawing/2014/main" id="{18578F14-6D5B-459A-A3B4-13BB38912888}"/>
               </a:ext>
             </a:extLst>
           </p:cNvPr>
           <p:cNvCxnSpPr>
             <a:cxnSpLocks/>
-            <a:stCxn id="5" idx="4"/>
-            <a:endCxn id="8" idx="1"/>
+            <a:stCxn id="16" idx="5"/>
+            <a:endCxn id="6" idx="0"/>
           </p:cNvCxnSpPr>
           <p:nvPr/>
         </p:nvCxnSpPr>
         <p:spPr>
           <a:xfrm rot="16200000" flipH="1">
-            <a:off x="4571631" y="3169071"/>
-            <a:ext cx="1487495" cy="666129"/>
+            <a:off x="7063814" y="1118570"/>
+            <a:ext cx="645675" cy="636349"/>
+          </a:xfrm>
+          <a:prstGeom prst="bentConnector3">
+            <a:avLst>
+              <a:gd name="adj1" fmla="val 50000"/>
+            </a:avLst>
+          </a:prstGeom>
+          <a:ln>
+            <a:solidFill>
+              <a:schemeClr val="tx1"/>
+            </a:solidFill>
+            <a:tailEnd type="triangle"/>
+          </a:ln>
+        </p:spPr>
+        <p:style>
+          <a:lnRef idx="1">
+            <a:schemeClr val="accent1"/>
+          </a:lnRef>
+          <a:fillRef idx="0">
+            <a:schemeClr val="accent1"/>
+          </a:fillRef>
+          <a:effectRef idx="0">
+            <a:schemeClr val="accent1"/>
+          </a:effectRef>
+          <a:fontRef idx="minor">
+            <a:schemeClr val="tx1"/>
+          </a:fontRef>
+        </p:style>
+      </p:cxnSp>
+      <p:cxnSp>
+        <p:nvCxnSpPr>
+          <p:cNvPr id="21" name="Conector: angular 20">
+            <a:extLst>
+              <a:ext uri="{FF2B5EF4-FFF2-40B4-BE49-F238E27FC236}">
+                <a16:creationId xmlns:a16="http://schemas.microsoft.com/office/drawing/2014/main" id="{FA5AC761-C271-4EA0-8FBE-701D54A2DEA6}"/>
+              </a:ext>
+            </a:extLst>
+          </p:cNvPr>
+          <p:cNvCxnSpPr>
+            <a:cxnSpLocks/>
+          </p:cNvCxnSpPr>
+          <p:nvPr/>
+        </p:nvCxnSpPr>
+        <p:spPr>
+          <a:xfrm rot="5400000">
+            <a:off x="4976401" y="1119822"/>
+            <a:ext cx="645675" cy="633848"/>
+          </a:xfrm>
+          <a:prstGeom prst="bentConnector3">
+            <a:avLst>
+              <a:gd name="adj1" fmla="val 50000"/>
+            </a:avLst>
+          </a:prstGeom>
+          <a:ln>
+            <a:solidFill>
+              <a:schemeClr val="tx1"/>
+            </a:solidFill>
+            <a:tailEnd type="triangle"/>
+          </a:ln>
+        </p:spPr>
+        <p:style>
+          <a:lnRef idx="1">
+            <a:schemeClr val="accent1"/>
+          </a:lnRef>
+          <a:fillRef idx="0">
+            <a:schemeClr val="accent1"/>
+          </a:fillRef>
+          <a:effectRef idx="0">
+            <a:schemeClr val="accent1"/>
+          </a:effectRef>
+          <a:fontRef idx="minor">
+            <a:schemeClr val="tx1"/>
+          </a:fontRef>
+        </p:style>
+      </p:cxnSp>
+      <p:sp>
+        <p:nvSpPr>
+          <p:cNvPr id="52" name="Elipse 51">
+            <a:extLst>
+              <a:ext uri="{FF2B5EF4-FFF2-40B4-BE49-F238E27FC236}">
+                <a16:creationId xmlns:a16="http://schemas.microsoft.com/office/drawing/2014/main" id="{A04FA5B3-B78E-42F1-B4D3-9B8FA55AD787}"/>
+              </a:ext>
+            </a:extLst>
+          </p:cNvPr>
+          <p:cNvSpPr/>
+          <p:nvPr/>
+        </p:nvSpPr>
+        <p:spPr>
+          <a:xfrm>
+            <a:off x="4706980" y="4724597"/>
+            <a:ext cx="3345524" cy="929880"/>
+          </a:xfrm>
+          <a:prstGeom prst="ellipse">
+            <a:avLst/>
+          </a:prstGeom>
+          <a:solidFill>
+            <a:schemeClr val="accent5"/>
+          </a:solidFill>
+          <a:ln>
+            <a:noFill/>
+          </a:ln>
+          <a:effectLst>
+            <a:outerShdw blurRad="76200" dir="13500000" sy="23000" kx="1200000" algn="br" rotWithShape="0">
+              <a:prstClr val="black">
+                <a:alpha val="20000"/>
+              </a:prstClr>
+            </a:outerShdw>
+          </a:effectLst>
+        </p:spPr>
+        <p:style>
+          <a:lnRef idx="2">
+            <a:schemeClr val="accent1">
+              <a:shade val="50000"/>
+            </a:schemeClr>
+          </a:lnRef>
+          <a:fillRef idx="1">
+            <a:schemeClr val="accent1"/>
+          </a:fillRef>
+          <a:effectRef idx="0">
+            <a:schemeClr val="accent1"/>
+          </a:effectRef>
+          <a:fontRef idx="minor">
+            <a:schemeClr val="lt1"/>
+          </a:fontRef>
+        </p:style>
+        <p:txBody>
+          <a:bodyPr rtlCol="0" anchor="ctr"/>
+          <a:lstStyle/>
+          <a:p>
+            <a:pPr algn="ctr"/>
+            <a:r>
+              <a:rPr lang="es-US" dirty="0">
+                <a:solidFill>
+                  <a:sysClr val="windowText" lastClr="000000"/>
+                </a:solidFill>
+              </a:rPr>
+              <a:t>Buscar correlación con Demanda de Energía</a:t>
+            </a:r>
+          </a:p>
+        </p:txBody>
+      </p:sp>
+      <p:cxnSp>
+        <p:nvCxnSpPr>
+          <p:cNvPr id="53" name="Conector: angular 52">
+            <a:extLst>
+              <a:ext uri="{FF2B5EF4-FFF2-40B4-BE49-F238E27FC236}">
+                <a16:creationId xmlns:a16="http://schemas.microsoft.com/office/drawing/2014/main" id="{E61940B0-DB89-4707-8BA5-1FADD175B266}"/>
+              </a:ext>
+            </a:extLst>
+          </p:cNvPr>
+          <p:cNvCxnSpPr>
+            <a:cxnSpLocks/>
+            <a:stCxn id="8" idx="4"/>
+            <a:endCxn id="52" idx="0"/>
+          </p:cNvCxnSpPr>
+          <p:nvPr/>
+        </p:nvCxnSpPr>
+        <p:spPr>
+          <a:xfrm rot="16200000" flipH="1">
+            <a:off x="6235071" y="4579925"/>
+            <a:ext cx="284205" cy="5138"/>
           </a:xfrm>
           <a:prstGeom prst="bentConnector3">
             <a:avLst/>
@@ -3759,74 +4218,94 @@
           </a:fontRef>
         </p:style>
       </p:cxnSp>
-      <p:cxnSp>
-        <p:nvCxnSpPr>
-          <p:cNvPr id="15" name="Conector: angular 14">
-            <a:extLst>
-              <a:ext uri="{FF2B5EF4-FFF2-40B4-BE49-F238E27FC236}">
-                <a16:creationId xmlns:a16="http://schemas.microsoft.com/office/drawing/2014/main" id="{6701C165-4D55-44D1-ABC2-DA424B356594}"/>
-              </a:ext>
-            </a:extLst>
-          </p:cNvPr>
-          <p:cNvCxnSpPr>
-            <a:cxnSpLocks/>
-            <a:stCxn id="6" idx="4"/>
-            <a:endCxn id="8" idx="7"/>
-          </p:cNvCxnSpPr>
+      <p:sp>
+        <p:nvSpPr>
+          <p:cNvPr id="72" name="Elipse 71">
+            <a:extLst>
+              <a:ext uri="{FF2B5EF4-FFF2-40B4-BE49-F238E27FC236}">
+                <a16:creationId xmlns:a16="http://schemas.microsoft.com/office/drawing/2014/main" id="{E0238F4D-BD2E-4D86-8A54-538D0D8D240B}"/>
+              </a:ext>
+            </a:extLst>
+          </p:cNvPr>
+          <p:cNvSpPr/>
           <p:nvPr/>
-        </p:nvCxnSpPr>
+        </p:nvSpPr>
         <p:spPr>
-          <a:xfrm rot="5400000">
-            <a:off x="6659045" y="3200102"/>
-            <a:ext cx="1487495" cy="604068"/>
+          <a:xfrm>
+            <a:off x="4757530" y="5915583"/>
+            <a:ext cx="3241965" cy="998806"/>
           </a:xfrm>
-          <a:prstGeom prst="bentConnector3">
+          <a:prstGeom prst="ellipse">
             <a:avLst/>
           </a:prstGeom>
+          <a:solidFill>
+            <a:schemeClr val="accent5"/>
+          </a:solidFill>
           <a:ln>
-            <a:solidFill>
-              <a:schemeClr val="tx1"/>
-            </a:solidFill>
-            <a:tailEnd type="triangle"/>
+            <a:noFill/>
           </a:ln>
+          <a:effectLst>
+            <a:outerShdw blurRad="76200" dir="13500000" sy="23000" kx="1200000" algn="br" rotWithShape="0">
+              <a:prstClr val="black">
+                <a:alpha val="20000"/>
+              </a:prstClr>
+            </a:outerShdw>
+          </a:effectLst>
         </p:spPr>
         <p:style>
-          <a:lnRef idx="1">
-            <a:schemeClr val="accent1"/>
+          <a:lnRef idx="2">
+            <a:schemeClr val="accent1">
+              <a:shade val="50000"/>
+            </a:schemeClr>
           </a:lnRef>
-          <a:fillRef idx="0">
+          <a:fillRef idx="1">
             <a:schemeClr val="accent1"/>
           </a:fillRef>
           <a:effectRef idx="0">
             <a:schemeClr val="accent1"/>
           </a:effectRef>
           <a:fontRef idx="minor">
-            <a:schemeClr val="tx1"/>
+            <a:schemeClr val="lt1"/>
           </a:fontRef>
         </p:style>
-      </p:cxnSp>
+        <p:txBody>
+          <a:bodyPr rtlCol="0" anchor="ctr"/>
+          <a:lstStyle/>
+          <a:p>
+            <a:pPr algn="ctr"/>
+            <a:r>
+              <a:rPr lang="es-US" dirty="0">
+                <a:solidFill>
+                  <a:sysClr val="windowText" lastClr="000000"/>
+                </a:solidFill>
+              </a:rPr>
+              <a:t>Considerarlas para modelo de pronóstico.</a:t>
+            </a:r>
+          </a:p>
+        </p:txBody>
+      </p:sp>
       <p:cxnSp>
         <p:nvCxnSpPr>
-          <p:cNvPr id="19" name="Conector: angular 18">
-            <a:extLst>
-              <a:ext uri="{FF2B5EF4-FFF2-40B4-BE49-F238E27FC236}">
-                <a16:creationId xmlns:a16="http://schemas.microsoft.com/office/drawing/2014/main" id="{15E50A0A-5685-40CF-9E1E-0B4B54B2ACF2}"/>
+          <p:cNvPr id="73" name="Conector: angular 72">
+            <a:extLst>
+              <a:ext uri="{FF2B5EF4-FFF2-40B4-BE49-F238E27FC236}">
+                <a16:creationId xmlns:a16="http://schemas.microsoft.com/office/drawing/2014/main" id="{F90DDD72-706A-4370-B4FA-76060D374B0A}"/>
               </a:ext>
             </a:extLst>
           </p:cNvPr>
           <p:cNvCxnSpPr>
             <a:cxnSpLocks/>
-            <a:stCxn id="7" idx="4"/>
-            <a:endCxn id="8" idx="6"/>
+            <a:stCxn id="52" idx="4"/>
+            <a:endCxn id="72" idx="0"/>
           </p:cNvCxnSpPr>
           <p:nvPr/>
         </p:nvCxnSpPr>
         <p:spPr>
           <a:xfrm rot="5400000">
-            <a:off x="7994127" y="2165804"/>
-            <a:ext cx="1840626" cy="3025796"/>
+            <a:off x="6248575" y="5784416"/>
+            <a:ext cx="261106" cy="1229"/>
           </a:xfrm>
-          <a:prstGeom prst="bentConnector2">
+          <a:prstGeom prst="bentConnector3">
             <a:avLst/>
           </a:prstGeom>
           <a:ln>

</xml_diff>